<commit_message>
Präsi noch einmal geändert
</commit_message>
<xml_diff>
--- a/Dokumentation/Abschlusspräsentation.pptx
+++ b/Dokumentation/Abschlusspräsentation.pptx
@@ -1212,7 +1212,7 @@
           <a:p>
             <a:r>
               <a:rPr lang="de-DE" dirty="0" smtClean="0"/>
-              <a:t>Volker</a:t>
+              <a:t>Marcus</a:t>
             </a:r>
             <a:endParaRPr lang="de-DE" dirty="0"/>
           </a:p>
@@ -3731,7 +3731,19 @@
             <a:pPr lvl="1"/>
             <a:r>
               <a:rPr lang="de-DE" kern="0" dirty="0" smtClean="0"/>
-              <a:t>Die Funktionen von Android wurden im großes Stil ausgenutzt</a:t>
+              <a:t>Funktionen </a:t>
+            </a:r>
+            <a:r>
+              <a:rPr lang="de-DE" kern="0" dirty="0" smtClean="0"/>
+              <a:t>von Android wurden im </a:t>
+            </a:r>
+            <a:r>
+              <a:rPr lang="de-DE" kern="0" dirty="0" smtClean="0"/>
+              <a:t>großen </a:t>
+            </a:r>
+            <a:r>
+              <a:rPr lang="de-DE" kern="0" dirty="0" smtClean="0"/>
+              <a:t>Stil ausgenutzt</a:t>
             </a:r>
           </a:p>
           <a:p>
@@ -9471,7 +9483,15 @@
             <a:pPr lvl="1"/>
             <a:r>
               <a:rPr lang="de-DE" dirty="0" smtClean="0"/>
-              <a:t>Viel neues Wissen konnte wir uns aneignen:</a:t>
+              <a:t>Viel neues Wissen </a:t>
+            </a:r>
+            <a:r>
+              <a:rPr lang="de-DE" dirty="0" smtClean="0"/>
+              <a:t>konnten </a:t>
+            </a:r>
+            <a:r>
+              <a:rPr lang="de-DE" dirty="0" smtClean="0"/>
+              <a:t>wir uns aneignen:</a:t>
             </a:r>
           </a:p>
           <a:p>

</xml_diff>